<commit_message>
#17 mock up menu
</commit_message>
<xml_diff>
--- a/docs/mockup.pptx
+++ b/docs/mockup.pptx
@@ -3328,12 +3328,42 @@
           <a:chExt cx="0" cy="0"/>
         </a:xfrm>
       </p:grpSpPr>
+      <p:pic>
+        <p:nvPicPr>
+          <p:cNvPr id="5" name="Picture 4">
+            <a:extLst>
+              <a:ext uri="{FF2B5EF4-FFF2-40B4-BE49-F238E27FC236}">
+                <a16:creationId xmlns:a16="http://schemas.microsoft.com/office/drawing/2014/main" id="{28EA663F-3241-4918-BDD4-26A45636B315}"/>
+              </a:ext>
+            </a:extLst>
+          </p:cNvPr>
+          <p:cNvPicPr>
+            <a:picLocks noChangeAspect="1"/>
+          </p:cNvPicPr>
+          <p:nvPr/>
+        </p:nvPicPr>
+        <p:blipFill>
+          <a:blip r:embed="rId2"/>
+          <a:stretch>
+            <a:fillRect/>
+          </a:stretch>
+        </p:blipFill>
+        <p:spPr>
+          <a:xfrm>
+            <a:off x="676275" y="2547937"/>
+            <a:ext cx="10534650" cy="1762125"/>
+          </a:xfrm>
+          <a:prstGeom prst="rect">
+            <a:avLst/>
+          </a:prstGeom>
+        </p:spPr>
+      </p:pic>
       <p:sp>
         <p:nvSpPr>
           <p:cNvPr id="6" name="Rectangle 5">
             <a:extLst>
               <a:ext uri="{FF2B5EF4-FFF2-40B4-BE49-F238E27FC236}">
-                <a16:creationId xmlns:a16="http://schemas.microsoft.com/office/drawing/2014/main" id="{B3E73D2F-2487-45F0-91A1-4015C865D162}"/>
+                <a16:creationId xmlns:a16="http://schemas.microsoft.com/office/drawing/2014/main" id="{F1CD29E8-399B-4AB5-99D7-0DE925AE4161}"/>
               </a:ext>
             </a:extLst>
           </p:cNvPr>
@@ -3342,7 +3372,7 @@
         </p:nvSpPr>
         <p:spPr>
           <a:xfrm>
-            <a:off x="4083927" y="515683"/>
+            <a:off x="4083925" y="515683"/>
             <a:ext cx="4289188" cy="923330"/>
           </a:xfrm>
           <a:prstGeom prst="rect">
@@ -3371,74 +3401,15 @@
                   </a:outerShdw>
                 </a:effectLst>
               </a:rPr>
-              <a:t>Mockup </a:t>
-            </a:r>
-            <a:r>
-              <a:rPr lang="en-US" sz="5400" dirty="0">
-                <a:ln w="0"/>
-                <a:solidFill>
-                  <a:schemeClr val="accent1"/>
-                </a:solidFill>
-                <a:effectLst>
-                  <a:outerShdw blurRad="38100" dist="25400" dir="5400000" algn="ctr" rotWithShape="0">
-                    <a:srgbClr val="6E747A">
-                      <a:alpha val="43000"/>
-                    </a:srgbClr>
-                  </a:outerShdw>
-                </a:effectLst>
-              </a:rPr>
-              <a:t>Menu</a:t>
-            </a:r>
-            <a:endParaRPr lang="en-US" sz="5400" b="0" cap="none" spc="0" dirty="0">
-              <a:ln w="0"/>
-              <a:solidFill>
-                <a:schemeClr val="accent1"/>
-              </a:solidFill>
-              <a:effectLst>
-                <a:outerShdw blurRad="38100" dist="25400" dir="5400000" algn="ctr" rotWithShape="0">
-                  <a:srgbClr val="6E747A">
-                    <a:alpha val="43000"/>
-                  </a:srgbClr>
-                </a:outerShdw>
-              </a:effectLst>
-            </a:endParaRPr>
-          </a:p>
-        </p:txBody>
-      </p:sp>
-      <p:pic>
-        <p:nvPicPr>
-          <p:cNvPr id="3" name="Picture 2">
-            <a:extLst>
-              <a:ext uri="{FF2B5EF4-FFF2-40B4-BE49-F238E27FC236}">
-                <a16:creationId xmlns:a16="http://schemas.microsoft.com/office/drawing/2014/main" id="{60C28B44-154B-407B-8349-2D654B3F97B8}"/>
-              </a:ext>
-            </a:extLst>
-          </p:cNvPr>
-          <p:cNvPicPr>
-            <a:picLocks noChangeAspect="1"/>
-          </p:cNvPicPr>
-          <p:nvPr/>
-        </p:nvPicPr>
-        <p:blipFill>
-          <a:blip r:embed="rId2"/>
-          <a:stretch>
-            <a:fillRect/>
-          </a:stretch>
-        </p:blipFill>
-        <p:spPr>
-          <a:xfrm>
-            <a:off x="923925" y="1819276"/>
-            <a:ext cx="10175264" cy="1685076"/>
-          </a:xfrm>
-          <a:prstGeom prst="rect">
-            <a:avLst/>
-          </a:prstGeom>
-        </p:spPr>
-      </p:pic>
+              <a:t>Mockup Menu</a:t>
+            </a:r>
+          </a:p>
+        </p:txBody>
+      </p:sp>
     </p:spTree>
     <p:extLst>
       <p:ext uri="{BB962C8B-B14F-4D97-AF65-F5344CB8AC3E}">
-        <p14:creationId xmlns:p14="http://schemas.microsoft.com/office/powerpoint/2010/main" val="3578101438"/>
+        <p14:creationId xmlns:p14="http://schemas.microsoft.com/office/powerpoint/2010/main" val="3599579613"/>
       </p:ext>
     </p:extLst>
   </p:cSld>

</xml_diff>